<commit_message>
the final edit for the presentation
</commit_message>
<xml_diff>
--- a/Presentation/Advance Project Guid.pptx
+++ b/Presentation/Advance Project Guid.pptx
@@ -3163,8 +3163,10 @@
                 </a:solidFill>
                 <a:latin typeface="Hobo Std" pitchFamily="34" charset="0"/>
               </a:rPr>
-              <a:t> N. Abu </a:t>
-            </a:r>
+              <a:t> N. Abu Karsh</a:t>
+            </a:r>
+          </a:p>
+          <a:p>
             <a:r>
               <a:rPr lang="en-US" dirty="0" smtClean="0">
                 <a:solidFill>
@@ -3172,27 +3174,7 @@
                 </a:solidFill>
                 <a:latin typeface="Hobo Std" pitchFamily="34" charset="0"/>
               </a:rPr>
-              <a:t>Karsh</a:t>
-            </a:r>
-          </a:p>
-          <a:p>
-            <a:r>
-              <a:rPr lang="en-US" dirty="0" smtClean="0">
-                <a:solidFill>
-                  <a:srgbClr val="0000FF"/>
-                </a:solidFill>
-                <a:latin typeface="Hobo Std" pitchFamily="34" charset="0"/>
-              </a:rPr>
-              <a:t>NID@L </a:t>
-            </a:r>
-            <a:r>
-              <a:rPr lang="en-US" dirty="0" smtClean="0">
-                <a:solidFill>
-                  <a:srgbClr val="0000FF"/>
-                </a:solidFill>
-                <a:latin typeface="Hobo Std" pitchFamily="34" charset="0"/>
-              </a:rPr>
-              <a:t>M. </a:t>
+              <a:t>NID@L M. </a:t>
             </a:r>
             <a:r>
               <a:rPr lang="en-US" dirty="0" err="1" smtClean="0">
@@ -3689,6 +3671,45 @@
               </a:rPr>
               <a:t>)</a:t>
             </a:r>
+            <a:r>
+              <a:rPr lang="en-US" sz="4800" b="1" dirty="0" smtClean="0">
+                <a:solidFill>
+                  <a:srgbClr val="C00000"/>
+                </a:solidFill>
+                <a:latin typeface="Cooper Std Black" pitchFamily="18" charset="0"/>
+                <a:cs typeface="ae_AlMateen" pitchFamily="18" charset="-78"/>
+              </a:rPr>
+              <a:t/>
+            </a:r>
+            <a:br>
+              <a:rPr lang="en-US" sz="4800" b="1" dirty="0" smtClean="0">
+                <a:solidFill>
+                  <a:srgbClr val="C00000"/>
+                </a:solidFill>
+                <a:latin typeface="Cooper Std Black" pitchFamily="18" charset="0"/>
+                <a:cs typeface="ae_AlMateen" pitchFamily="18" charset="-78"/>
+              </a:rPr>
+            </a:br>
+            <a:r>
+              <a:rPr lang="en-US" sz="4800" b="1" dirty="0" err="1" smtClean="0">
+                <a:solidFill>
+                  <a:srgbClr val="C00000"/>
+                </a:solidFill>
+                <a:latin typeface="Cooper Std Black" pitchFamily="18" charset="0"/>
+                <a:cs typeface="ae_AlMateen" pitchFamily="18" charset="-78"/>
+              </a:rPr>
+              <a:t>Cocoo</a:t>
+            </a:r>
+            <a:r>
+              <a:rPr lang="en-US" sz="4800" b="1" dirty="0" smtClean="0">
+                <a:solidFill>
+                  <a:srgbClr val="C00000"/>
+                </a:solidFill>
+                <a:latin typeface="Cooper Std Black" pitchFamily="18" charset="0"/>
+                <a:cs typeface="ae_AlMateen" pitchFamily="18" charset="-78"/>
+              </a:rPr>
+              <a:t> – ER Diagram</a:t>
+            </a:r>
             <a:endParaRPr lang="ar-SA" sz="4800" b="1" dirty="0" smtClean="0">
               <a:solidFill>
                 <a:srgbClr val="C00000"/>
@@ -3895,12 +3916,32 @@
             <p:ph type="title"/>
           </p:nvPr>
         </p:nvSpPr>
-        <p:spPr/>
+        <p:spPr>
+          <a:xfrm>
+            <a:off x="762000" y="1447800"/>
+            <a:ext cx="8229600" cy="1143000"/>
+          </a:xfrm>
+        </p:spPr>
         <p:txBody>
-          <a:bodyPr/>
+          <a:bodyPr>
+            <a:normAutofit/>
+          </a:bodyPr>
           <a:lstStyle/>
           <a:p>
-            <a:endParaRPr lang="ar-SA"/>
+            <a:r>
+              <a:rPr lang="en-US" sz="2800" dirty="0" smtClean="0">
+                <a:solidFill>
+                  <a:srgbClr val="FF0000"/>
+                </a:solidFill>
+                <a:latin typeface="Hobo Std" pitchFamily="34" charset="0"/>
+              </a:rPr>
+              <a:t>View Projects</a:t>
+            </a:r>
+            <a:endParaRPr lang="ar-SA" sz="2800" dirty="0">
+              <a:solidFill>
+                <a:srgbClr val="FF0000"/>
+              </a:solidFill>
+            </a:endParaRPr>
           </a:p>
         </p:txBody>
       </p:sp>
@@ -3923,8 +3964,8 @@
         </p:blipFill>
         <p:spPr>
           <a:xfrm>
-            <a:off x="3124200" y="2895600"/>
-            <a:ext cx="2514600" cy="1771650"/>
+            <a:off x="3392129" y="2519795"/>
+            <a:ext cx="3237271" cy="2280805"/>
           </a:xfrm>
         </p:spPr>
       </p:pic>
@@ -3945,7 +3986,7 @@
         </p:blipFill>
         <p:spPr>
           <a:xfrm>
-            <a:off x="5867400" y="5086350"/>
+            <a:off x="7067550" y="5086350"/>
             <a:ext cx="2076450" cy="1771650"/>
           </a:xfrm>
           <a:prstGeom prst="rect">
@@ -3970,7 +4011,7 @@
         </p:blipFill>
         <p:spPr>
           <a:xfrm>
-            <a:off x="1295400" y="1066800"/>
+            <a:off x="228600" y="1066800"/>
             <a:ext cx="1752600" cy="1771650"/>
           </a:xfrm>
           <a:prstGeom prst="rect">
@@ -3978,6 +4019,245 @@
           </a:prstGeom>
         </p:spPr>
       </p:pic>
+      <p:sp>
+        <p:nvSpPr>
+          <p:cNvPr id="7" name="Title 1"/>
+          <p:cNvSpPr txBox="1">
+            <a:spLocks/>
+          </p:cNvSpPr>
+          <p:nvPr/>
+        </p:nvSpPr>
+        <p:spPr>
+          <a:xfrm>
+            <a:off x="609600" y="427038"/>
+            <a:ext cx="8229600" cy="1143000"/>
+          </a:xfrm>
+          <a:prstGeom prst="rect">
+            <a:avLst/>
+          </a:prstGeom>
+        </p:spPr>
+        <p:txBody>
+          <a:bodyPr vert="horz" lIns="91440" tIns="45720" rIns="91440" bIns="45720" rtlCol="1" anchor="ctr">
+            <a:normAutofit/>
+          </a:bodyPr>
+          <a:lstStyle/>
+          <a:p>
+            <a:pPr marL="0" marR="0" lvl="0" indent="0" algn="ctr" defTabSz="914400" rtl="1" eaLnBrk="1" fontAlgn="auto" latinLnBrk="0" hangingPunct="1">
+              <a:lnSpc>
+                <a:spcPct val="100000"/>
+              </a:lnSpc>
+              <a:spcBef>
+                <a:spcPct val="0"/>
+              </a:spcBef>
+              <a:spcAft>
+                <a:spcPts val="0"/>
+              </a:spcAft>
+              <a:buClrTx/>
+              <a:buSzTx/>
+              <a:buFontTx/>
+              <a:buNone/>
+              <a:tabLst/>
+              <a:defRPr/>
+            </a:pPr>
+            <a:r>
+              <a:rPr kumimoji="0" lang="en-US" sz="4400" b="0" i="0" u="none" strike="noStrike" kern="1200" cap="none" spc="0" normalizeH="0" baseline="0" noProof="0" dirty="0" smtClean="0">
+                <a:ln>
+                  <a:noFill/>
+                </a:ln>
+                <a:solidFill>
+                  <a:schemeClr val="tx1"/>
+                </a:solidFill>
+                <a:effectLst/>
+                <a:uLnTx/>
+                <a:uFillTx/>
+                <a:latin typeface="Hobo Std" pitchFamily="34" charset="0"/>
+                <a:ea typeface="+mj-ea"/>
+                <a:cs typeface="+mj-cs"/>
+              </a:rPr>
+              <a:t>What’s Our Project do</a:t>
+            </a:r>
+            <a:endParaRPr kumimoji="0" lang="ar-SA" sz="4400" b="0" i="0" u="none" strike="noStrike" kern="1200" cap="none" spc="0" normalizeH="0" baseline="0" noProof="0" dirty="0">
+              <a:ln>
+                <a:noFill/>
+              </a:ln>
+              <a:solidFill>
+                <a:schemeClr val="tx1"/>
+              </a:solidFill>
+              <a:effectLst/>
+              <a:uLnTx/>
+              <a:uFillTx/>
+              <a:latin typeface="+mj-lt"/>
+              <a:ea typeface="+mj-ea"/>
+              <a:cs typeface="+mj-cs"/>
+            </a:endParaRPr>
+          </a:p>
+        </p:txBody>
+      </p:sp>
+      <p:sp>
+        <p:nvSpPr>
+          <p:cNvPr id="8" name="Title 1"/>
+          <p:cNvSpPr txBox="1">
+            <a:spLocks/>
+          </p:cNvSpPr>
+          <p:nvPr/>
+        </p:nvSpPr>
+        <p:spPr>
+          <a:xfrm>
+            <a:off x="533400" y="3276600"/>
+            <a:ext cx="8229600" cy="1143000"/>
+          </a:xfrm>
+          <a:prstGeom prst="rect">
+            <a:avLst/>
+          </a:prstGeom>
+        </p:spPr>
+        <p:txBody>
+          <a:bodyPr vert="horz" lIns="91440" tIns="45720" rIns="91440" bIns="45720" rtlCol="1" anchor="ctr">
+            <a:normAutofit/>
+          </a:bodyPr>
+          <a:lstStyle/>
+          <a:p>
+            <a:pPr marL="0" marR="0" lvl="0" indent="0" algn="ctr" defTabSz="914400" rtl="1" eaLnBrk="1" fontAlgn="auto" latinLnBrk="0" hangingPunct="1">
+              <a:lnSpc>
+                <a:spcPct val="100000"/>
+              </a:lnSpc>
+              <a:spcBef>
+                <a:spcPct val="0"/>
+              </a:spcBef>
+              <a:spcAft>
+                <a:spcPts val="0"/>
+              </a:spcAft>
+              <a:buClrTx/>
+              <a:buSzTx/>
+              <a:buFontTx/>
+              <a:buNone/>
+              <a:tabLst/>
+              <a:defRPr/>
+            </a:pPr>
+            <a:r>
+              <a:rPr kumimoji="0" lang="en-US" sz="2800" b="0" i="0" u="none" strike="noStrike" kern="1200" cap="none" spc="0" normalizeH="0" baseline="0" noProof="0" dirty="0" smtClean="0">
+                <a:ln>
+                  <a:noFill/>
+                </a:ln>
+                <a:solidFill>
+                  <a:srgbClr val="FF0000"/>
+                </a:solidFill>
+                <a:effectLst/>
+                <a:uLnTx/>
+                <a:uFillTx/>
+                <a:latin typeface="Hobo Std" pitchFamily="34" charset="0"/>
+                <a:ea typeface="+mj-ea"/>
+                <a:cs typeface="+mj-cs"/>
+              </a:rPr>
+              <a:t>Searching</a:t>
+            </a:r>
+            <a:r>
+              <a:rPr kumimoji="0" lang="en-US" sz="2800" b="0" i="0" u="none" strike="noStrike" kern="1200" cap="none" spc="0" normalizeH="0" noProof="0" dirty="0" smtClean="0">
+                <a:ln>
+                  <a:noFill/>
+                </a:ln>
+                <a:solidFill>
+                  <a:srgbClr val="FF0000"/>
+                </a:solidFill>
+                <a:effectLst/>
+                <a:uLnTx/>
+                <a:uFillTx/>
+                <a:latin typeface="Hobo Std" pitchFamily="34" charset="0"/>
+                <a:ea typeface="+mj-ea"/>
+                <a:cs typeface="+mj-cs"/>
+              </a:rPr>
+              <a:t> for Projects</a:t>
+            </a:r>
+            <a:endParaRPr kumimoji="0" lang="ar-SA" sz="2800" b="0" i="0" u="none" strike="noStrike" kern="1200" cap="none" spc="0" normalizeH="0" baseline="0" noProof="0" dirty="0">
+              <a:ln>
+                <a:noFill/>
+              </a:ln>
+              <a:solidFill>
+                <a:srgbClr val="FF0000"/>
+              </a:solidFill>
+              <a:effectLst/>
+              <a:uLnTx/>
+              <a:uFillTx/>
+              <a:latin typeface="+mj-lt"/>
+              <a:ea typeface="+mj-ea"/>
+              <a:cs typeface="+mj-cs"/>
+            </a:endParaRPr>
+          </a:p>
+        </p:txBody>
+      </p:sp>
+      <p:sp>
+        <p:nvSpPr>
+          <p:cNvPr id="9" name="Title 1"/>
+          <p:cNvSpPr txBox="1">
+            <a:spLocks/>
+          </p:cNvSpPr>
+          <p:nvPr/>
+        </p:nvSpPr>
+        <p:spPr>
+          <a:xfrm>
+            <a:off x="-609600" y="5105400"/>
+            <a:ext cx="8229600" cy="1143000"/>
+          </a:xfrm>
+          <a:prstGeom prst="rect">
+            <a:avLst/>
+          </a:prstGeom>
+        </p:spPr>
+        <p:txBody>
+          <a:bodyPr vert="horz" lIns="91440" tIns="45720" rIns="91440" bIns="45720" rtlCol="1" anchor="ctr">
+            <a:normAutofit/>
+          </a:bodyPr>
+          <a:lstStyle/>
+          <a:p>
+            <a:pPr marL="0" marR="0" lvl="0" indent="0" algn="ctr" defTabSz="914400" rtl="1" eaLnBrk="1" fontAlgn="auto" latinLnBrk="0" hangingPunct="1">
+              <a:lnSpc>
+                <a:spcPct val="100000"/>
+              </a:lnSpc>
+              <a:spcBef>
+                <a:spcPct val="0"/>
+              </a:spcBef>
+              <a:spcAft>
+                <a:spcPts val="0"/>
+              </a:spcAft>
+              <a:buClrTx/>
+              <a:buSzTx/>
+              <a:buFontTx/>
+              <a:buNone/>
+              <a:tabLst/>
+              <a:defRPr/>
+            </a:pPr>
+            <a:r>
+              <a:rPr kumimoji="0" lang="en-US" sz="2800" b="0" i="0" u="none" strike="noStrike" kern="1200" cap="none" spc="0" normalizeH="0" baseline="0" noProof="0" dirty="0" smtClean="0">
+                <a:ln>
+                  <a:noFill/>
+                </a:ln>
+                <a:solidFill>
+                  <a:srgbClr val="FF0000"/>
+                </a:solidFill>
+                <a:effectLst/>
+                <a:uLnTx/>
+                <a:uFillTx/>
+                <a:latin typeface="Hobo Std" pitchFamily="34" charset="0"/>
+                <a:ea typeface="+mj-ea"/>
+                <a:cs typeface="+mj-cs"/>
+              </a:rPr>
+              <a:t>Add Projects</a:t>
+            </a:r>
+            <a:endParaRPr kumimoji="0" lang="ar-SA" sz="2800" b="0" i="0" u="none" strike="noStrike" kern="1200" cap="none" spc="0" normalizeH="0" baseline="0" noProof="0" dirty="0">
+              <a:ln>
+                <a:noFill/>
+              </a:ln>
+              <a:solidFill>
+                <a:srgbClr val="FF0000"/>
+              </a:solidFill>
+              <a:effectLst/>
+              <a:uLnTx/>
+              <a:uFillTx/>
+              <a:latin typeface="+mj-lt"/>
+              <a:ea typeface="+mj-ea"/>
+              <a:cs typeface="+mj-cs"/>
+            </a:endParaRPr>
+          </a:p>
+        </p:txBody>
+      </p:sp>
     </p:spTree>
   </p:cSld>
   <p:clrMapOvr>
@@ -4004,7 +4284,7 @@
                             </p:stCondLst>
                             <p:childTnLst>
                               <p:par>
-                                <p:cTn id="5" presetID="29" presetClass="entr" presetSubtype="0" fill="hold" nodeType="clickEffect">
+                                <p:cTn id="5" presetID="14" presetClass="entr" presetSubtype="10" fill="hold" grpId="0" nodeType="clickEffect">
                                   <p:stCondLst>
                                     <p:cond delay="0"/>
                                   </p:stCondLst>
@@ -4017,6 +4297,59 @@
                                           </p:stCondLst>
                                         </p:cTn>
                                         <p:tgtEl>
+                                          <p:spTgt spid="7"/>
+                                        </p:tgtEl>
+                                        <p:attrNameLst>
+                                          <p:attrName>style.visibility</p:attrName>
+                                        </p:attrNameLst>
+                                      </p:cBhvr>
+                                      <p:to>
+                                        <p:strVal val="visible"/>
+                                      </p:to>
+                                    </p:set>
+                                    <p:animEffect transition="in" filter="randombar(horizontal)">
+                                      <p:cBhvr>
+                                        <p:cTn id="7" dur="500"/>
+                                        <p:tgtEl>
+                                          <p:spTgt spid="7"/>
+                                        </p:tgtEl>
+                                      </p:cBhvr>
+                                    </p:animEffect>
+                                  </p:childTnLst>
+                                </p:cTn>
+                              </p:par>
+                            </p:childTnLst>
+                          </p:cTn>
+                        </p:par>
+                      </p:childTnLst>
+                    </p:cTn>
+                  </p:par>
+                  <p:par>
+                    <p:cTn id="8" fill="hold">
+                      <p:stCondLst>
+                        <p:cond delay="indefinite"/>
+                      </p:stCondLst>
+                      <p:childTnLst>
+                        <p:par>
+                          <p:cTn id="9" fill="hold">
+                            <p:stCondLst>
+                              <p:cond delay="0"/>
+                            </p:stCondLst>
+                            <p:childTnLst>
+                              <p:par>
+                                <p:cTn id="10" presetID="29" presetClass="entr" presetSubtype="0" fill="hold" nodeType="clickEffect">
+                                  <p:stCondLst>
+                                    <p:cond delay="0"/>
+                                  </p:stCondLst>
+                                  <p:childTnLst>
+                                    <p:set>
+                                      <p:cBhvr>
+                                        <p:cTn id="11" dur="1" fill="hold">
+                                          <p:stCondLst>
+                                            <p:cond delay="0"/>
+                                          </p:stCondLst>
+                                        </p:cTn>
+                                        <p:tgtEl>
                                           <p:spTgt spid="6"/>
                                         </p:tgtEl>
                                         <p:attrNameLst>
@@ -4029,7 +4362,7 @@
                                     </p:set>
                                     <p:anim calcmode="lin" valueType="num">
                                       <p:cBhvr>
-                                        <p:cTn id="7" dur="1000" fill="hold"/>
+                                        <p:cTn id="12" dur="1000" fill="hold"/>
                                         <p:tgtEl>
                                           <p:spTgt spid="6"/>
                                         </p:tgtEl>
@@ -4052,7 +4385,7 @@
                                     </p:anim>
                                     <p:anim calcmode="lin" valueType="num">
                                       <p:cBhvr>
-                                        <p:cTn id="8" dur="1000" fill="hold"/>
+                                        <p:cTn id="13" dur="1000" fill="hold"/>
                                         <p:tgtEl>
                                           <p:spTgt spid="6"/>
                                         </p:tgtEl>
@@ -4075,7 +4408,7 @@
                                     </p:anim>
                                     <p:animEffect transition="in" filter="wipe(right)" prLst="gradientSize: 0.1">
                                       <p:cBhvr>
-                                        <p:cTn id="9" dur="1000"/>
+                                        <p:cTn id="14" dur="1000"/>
                                         <p:tgtEl>
                                           <p:spTgt spid="6"/>
                                         </p:tgtEl>
@@ -4091,26 +4424,95 @@
                     </p:cTn>
                   </p:par>
                   <p:par>
-                    <p:cTn id="10" fill="hold">
+                    <p:cTn id="15" fill="hold">
                       <p:stCondLst>
                         <p:cond delay="indefinite"/>
                       </p:stCondLst>
                       <p:childTnLst>
                         <p:par>
-                          <p:cTn id="11" fill="hold">
+                          <p:cTn id="16" fill="hold">
                             <p:stCondLst>
                               <p:cond delay="0"/>
                             </p:stCondLst>
                             <p:childTnLst>
                               <p:par>
-                                <p:cTn id="12" presetID="19" presetClass="entr" presetSubtype="10" fill="hold" nodeType="clickEffect">
+                                <p:cTn id="17" presetID="14" presetClass="entr" presetSubtype="10" fill="hold" grpId="0" nodeType="clickEffect">
                                   <p:stCondLst>
                                     <p:cond delay="0"/>
                                   </p:stCondLst>
                                   <p:childTnLst>
                                     <p:set>
                                       <p:cBhvr>
-                                        <p:cTn id="13" dur="1" fill="hold">
+                                        <p:cTn id="18" dur="1" fill="hold">
+                                          <p:stCondLst>
+                                            <p:cond delay="0"/>
+                                          </p:stCondLst>
+                                        </p:cTn>
+                                        <p:tgtEl>
+                                          <p:spTgt spid="2"/>
+                                        </p:tgtEl>
+                                        <p:attrNameLst>
+                                          <p:attrName>style.visibility</p:attrName>
+                                        </p:attrNameLst>
+                                      </p:cBhvr>
+                                      <p:to>
+                                        <p:strVal val="visible"/>
+                                      </p:to>
+                                    </p:set>
+                                    <p:animEffect transition="in" filter="randombar(horizontal)">
+                                      <p:cBhvr>
+                                        <p:cTn id="19" dur="500"/>
+                                        <p:tgtEl>
+                                          <p:spTgt spid="2"/>
+                                        </p:tgtEl>
+                                      </p:cBhvr>
+                                    </p:animEffect>
+                                  </p:childTnLst>
+                                  <p:subTnLst>
+                                    <p:set>
+                                      <p:cBhvr override="childStyle">
+                                        <p:cTn dur="1" fill="hold" display="0" masterRel="nextClick" afterEffect="1"/>
+                                        <p:tgtEl>
+                                          <p:spTgt spid="2"/>
+                                        </p:tgtEl>
+                                        <p:attrNameLst>
+                                          <p:attrName>style.visibility</p:attrName>
+                                        </p:attrNameLst>
+                                      </p:cBhvr>
+                                      <p:to>
+                                        <p:strVal val="hidden"/>
+                                      </p:to>
+                                    </p:set>
+                                  </p:subTnLst>
+                                </p:cTn>
+                              </p:par>
+                            </p:childTnLst>
+                          </p:cTn>
+                        </p:par>
+                      </p:childTnLst>
+                    </p:cTn>
+                  </p:par>
+                  <p:par>
+                    <p:cTn id="20" fill="hold">
+                      <p:stCondLst>
+                        <p:cond delay="indefinite"/>
+                      </p:stCondLst>
+                      <p:childTnLst>
+                        <p:par>
+                          <p:cTn id="21" fill="hold">
+                            <p:stCondLst>
+                              <p:cond delay="0"/>
+                            </p:stCondLst>
+                            <p:childTnLst>
+                              <p:par>
+                                <p:cTn id="22" presetID="19" presetClass="entr" presetSubtype="10" fill="hold" nodeType="clickEffect">
+                                  <p:stCondLst>
+                                    <p:cond delay="0"/>
+                                  </p:stCondLst>
+                                  <p:childTnLst>
+                                    <p:set>
+                                      <p:cBhvr>
+                                        <p:cTn id="23" dur="1" fill="hold">
                                           <p:stCondLst>
                                             <p:cond delay="0"/>
                                           </p:stCondLst>
@@ -4128,7 +4530,7 @@
                                     </p:set>
                                     <p:anim calcmode="lin" valueType="num">
                                       <p:cBhvr>
-                                        <p:cTn id="14" dur="5000" fill="hold"/>
+                                        <p:cTn id="24" dur="5000" fill="hold"/>
                                         <p:tgtEl>
                                           <p:spTgt spid="4"/>
                                         </p:tgtEl>
@@ -4151,7 +4553,7 @@
                                     </p:anim>
                                     <p:anim calcmode="lin" valueType="num">
                                       <p:cBhvr>
-                                        <p:cTn id="15" dur="5000" fill="hold"/>
+                                        <p:cTn id="25" dur="5000" fill="hold"/>
                                         <p:tgtEl>
                                           <p:spTgt spid="4"/>
                                         </p:tgtEl>
@@ -4182,26 +4584,95 @@
                     </p:cTn>
                   </p:par>
                   <p:par>
-                    <p:cTn id="16" fill="hold">
+                    <p:cTn id="26" fill="hold">
                       <p:stCondLst>
                         <p:cond delay="indefinite"/>
                       </p:stCondLst>
                       <p:childTnLst>
                         <p:par>
-                          <p:cTn id="17" fill="hold">
+                          <p:cTn id="27" fill="hold">
                             <p:stCondLst>
                               <p:cond delay="0"/>
                             </p:stCondLst>
                             <p:childTnLst>
                               <p:par>
-                                <p:cTn id="18" presetID="12" presetClass="entr" presetSubtype="4" fill="hold" nodeType="clickEffect">
+                                <p:cTn id="28" presetID="14" presetClass="entr" presetSubtype="10" fill="hold" grpId="0" nodeType="clickEffect">
                                   <p:stCondLst>
                                     <p:cond delay="0"/>
                                   </p:stCondLst>
                                   <p:childTnLst>
                                     <p:set>
                                       <p:cBhvr>
-                                        <p:cTn id="19" dur="1" fill="hold">
+                                        <p:cTn id="29" dur="1" fill="hold">
+                                          <p:stCondLst>
+                                            <p:cond delay="0"/>
+                                          </p:stCondLst>
+                                        </p:cTn>
+                                        <p:tgtEl>
+                                          <p:spTgt spid="8"/>
+                                        </p:tgtEl>
+                                        <p:attrNameLst>
+                                          <p:attrName>style.visibility</p:attrName>
+                                        </p:attrNameLst>
+                                      </p:cBhvr>
+                                      <p:to>
+                                        <p:strVal val="visible"/>
+                                      </p:to>
+                                    </p:set>
+                                    <p:animEffect transition="in" filter="randombar(horizontal)">
+                                      <p:cBhvr>
+                                        <p:cTn id="30" dur="500"/>
+                                        <p:tgtEl>
+                                          <p:spTgt spid="8"/>
+                                        </p:tgtEl>
+                                      </p:cBhvr>
+                                    </p:animEffect>
+                                  </p:childTnLst>
+                                  <p:subTnLst>
+                                    <p:set>
+                                      <p:cBhvr override="childStyle">
+                                        <p:cTn dur="1" fill="hold" display="0" masterRel="nextClick" afterEffect="1"/>
+                                        <p:tgtEl>
+                                          <p:spTgt spid="8"/>
+                                        </p:tgtEl>
+                                        <p:attrNameLst>
+                                          <p:attrName>style.visibility</p:attrName>
+                                        </p:attrNameLst>
+                                      </p:cBhvr>
+                                      <p:to>
+                                        <p:strVal val="hidden"/>
+                                      </p:to>
+                                    </p:set>
+                                  </p:subTnLst>
+                                </p:cTn>
+                              </p:par>
+                            </p:childTnLst>
+                          </p:cTn>
+                        </p:par>
+                      </p:childTnLst>
+                    </p:cTn>
+                  </p:par>
+                  <p:par>
+                    <p:cTn id="31" fill="hold">
+                      <p:stCondLst>
+                        <p:cond delay="indefinite"/>
+                      </p:stCondLst>
+                      <p:childTnLst>
+                        <p:par>
+                          <p:cTn id="32" fill="hold">
+                            <p:stCondLst>
+                              <p:cond delay="0"/>
+                            </p:stCondLst>
+                            <p:childTnLst>
+                              <p:par>
+                                <p:cTn id="33" presetID="12" presetClass="entr" presetSubtype="4" fill="hold" nodeType="clickEffect">
+                                  <p:stCondLst>
+                                    <p:cond delay="0"/>
+                                  </p:stCondLst>
+                                  <p:childTnLst>
+                                    <p:set>
+                                      <p:cBhvr>
+                                        <p:cTn id="34" dur="1" fill="hold">
                                           <p:stCondLst>
                                             <p:cond delay="0"/>
                                           </p:stCondLst>
@@ -4219,13 +4690,82 @@
                                     </p:set>
                                     <p:animEffect transition="in" filter="slide(fromBottom)">
                                       <p:cBhvr>
-                                        <p:cTn id="20" dur="500"/>
+                                        <p:cTn id="35" dur="500"/>
                                         <p:tgtEl>
                                           <p:spTgt spid="5"/>
                                         </p:tgtEl>
                                       </p:cBhvr>
                                     </p:animEffect>
                                   </p:childTnLst>
+                                </p:cTn>
+                              </p:par>
+                            </p:childTnLst>
+                          </p:cTn>
+                        </p:par>
+                      </p:childTnLst>
+                    </p:cTn>
+                  </p:par>
+                  <p:par>
+                    <p:cTn id="36" fill="hold">
+                      <p:stCondLst>
+                        <p:cond delay="indefinite"/>
+                      </p:stCondLst>
+                      <p:childTnLst>
+                        <p:par>
+                          <p:cTn id="37" fill="hold">
+                            <p:stCondLst>
+                              <p:cond delay="0"/>
+                            </p:stCondLst>
+                            <p:childTnLst>
+                              <p:par>
+                                <p:cTn id="38" presetID="14" presetClass="entr" presetSubtype="10" fill="hold" grpId="0" nodeType="clickEffect">
+                                  <p:stCondLst>
+                                    <p:cond delay="0"/>
+                                  </p:stCondLst>
+                                  <p:childTnLst>
+                                    <p:set>
+                                      <p:cBhvr>
+                                        <p:cTn id="39" dur="1" fill="hold">
+                                          <p:stCondLst>
+                                            <p:cond delay="0"/>
+                                          </p:stCondLst>
+                                        </p:cTn>
+                                        <p:tgtEl>
+                                          <p:spTgt spid="9"/>
+                                        </p:tgtEl>
+                                        <p:attrNameLst>
+                                          <p:attrName>style.visibility</p:attrName>
+                                        </p:attrNameLst>
+                                      </p:cBhvr>
+                                      <p:to>
+                                        <p:strVal val="visible"/>
+                                      </p:to>
+                                    </p:set>
+                                    <p:animEffect transition="in" filter="randombar(horizontal)">
+                                      <p:cBhvr>
+                                        <p:cTn id="40" dur="500"/>
+                                        <p:tgtEl>
+                                          <p:spTgt spid="9"/>
+                                        </p:tgtEl>
+                                      </p:cBhvr>
+                                    </p:animEffect>
+                                  </p:childTnLst>
+                                  <p:subTnLst>
+                                    <p:set>
+                                      <p:cBhvr override="childStyle">
+                                        <p:cTn dur="1" fill="hold" display="0" masterRel="nextClick" afterEffect="1"/>
+                                        <p:tgtEl>
+                                          <p:spTgt spid="9"/>
+                                        </p:tgtEl>
+                                        <p:attrNameLst>
+                                          <p:attrName>style.visibility</p:attrName>
+                                        </p:attrNameLst>
+                                      </p:cBhvr>
+                                      <p:to>
+                                        <p:strVal val="hidden"/>
+                                      </p:to>
+                                    </p:set>
+                                  </p:subTnLst>
                                 </p:cTn>
                               </p:par>
                             </p:childTnLst>
@@ -4255,6 +4795,12 @@
         </p:cTn>
       </p:par>
     </p:tnLst>
+    <p:bldLst>
+      <p:bldP spid="2" grpId="0"/>
+      <p:bldP spid="7" grpId="0"/>
+      <p:bldP spid="8" grpId="0"/>
+      <p:bldP spid="9" grpId="0"/>
+    </p:bldLst>
   </p:timing>
 </p:sld>
 </file>
@@ -4317,10 +4863,88 @@
           <a:bodyPr/>
           <a:lstStyle/>
           <a:p>
-            <a:endParaRPr lang="ar-SA"/>
+            <a:r>
+              <a:rPr lang="en-US" dirty="0" smtClean="0">
+                <a:latin typeface="Hobo Std" pitchFamily="34" charset="0"/>
+              </a:rPr>
+              <a:t>Out put Snapshoot</a:t>
+            </a:r>
+            <a:endParaRPr lang="ar-SA" dirty="0"/>
           </a:p>
         </p:txBody>
       </p:sp>
+      <p:pic>
+        <p:nvPicPr>
+          <p:cNvPr id="4" name="Picture 3" descr="snap 2.JPG"/>
+          <p:cNvPicPr>
+            <a:picLocks noChangeAspect="1"/>
+          </p:cNvPicPr>
+          <p:nvPr/>
+        </p:nvPicPr>
+        <p:blipFill>
+          <a:blip r:embed="rId3" cstate="print"/>
+          <a:stretch>
+            <a:fillRect/>
+          </a:stretch>
+        </p:blipFill>
+        <p:spPr>
+          <a:xfrm>
+            <a:off x="6705921" y="1676400"/>
+            <a:ext cx="2438079" cy="2590800"/>
+          </a:xfrm>
+          <a:prstGeom prst="rect">
+            <a:avLst/>
+          </a:prstGeom>
+        </p:spPr>
+      </p:pic>
+      <p:pic>
+        <p:nvPicPr>
+          <p:cNvPr id="5" name="Picture 4" descr="snap 2.JPG"/>
+          <p:cNvPicPr>
+            <a:picLocks noChangeAspect="1"/>
+          </p:cNvPicPr>
+          <p:nvPr/>
+        </p:nvPicPr>
+        <p:blipFill>
+          <a:blip r:embed="rId4" cstate="print"/>
+          <a:stretch>
+            <a:fillRect/>
+          </a:stretch>
+        </p:blipFill>
+        <p:spPr>
+          <a:xfrm>
+            <a:off x="3048000" y="3276600"/>
+            <a:ext cx="2743200" cy="1052576"/>
+          </a:xfrm>
+          <a:prstGeom prst="rect">
+            <a:avLst/>
+          </a:prstGeom>
+        </p:spPr>
+      </p:pic>
+      <p:pic>
+        <p:nvPicPr>
+          <p:cNvPr id="7" name="Picture 6" descr="snap 2.JPG"/>
+          <p:cNvPicPr>
+            <a:picLocks noChangeAspect="1"/>
+          </p:cNvPicPr>
+          <p:nvPr/>
+        </p:nvPicPr>
+        <p:blipFill>
+          <a:blip r:embed="rId5" cstate="print"/>
+          <a:stretch>
+            <a:fillRect/>
+          </a:stretch>
+        </p:blipFill>
+        <p:spPr>
+          <a:xfrm>
+            <a:off x="381000" y="5181600"/>
+            <a:ext cx="3716056" cy="793805"/>
+          </a:xfrm>
+          <a:prstGeom prst="rect">
+            <a:avLst/>
+          </a:prstGeom>
+        </p:spPr>
+      </p:pic>
     </p:spTree>
   </p:cSld>
   <p:clrMapOvr>
@@ -4329,7 +4953,327 @@
   <p:timing>
     <p:tnLst>
       <p:par>
-        <p:cTn id="1" dur="indefinite" restart="never" nodeType="tmRoot"/>
+        <p:cTn id="1" dur="indefinite" restart="never" nodeType="tmRoot">
+          <p:childTnLst>
+            <p:seq concurrent="1" nextAc="seek">
+              <p:cTn id="2" dur="indefinite" nodeType="mainSeq">
+                <p:childTnLst>
+                  <p:par>
+                    <p:cTn id="3" fill="hold">
+                      <p:stCondLst>
+                        <p:cond delay="indefinite"/>
+                      </p:stCondLst>
+                      <p:childTnLst>
+                        <p:par>
+                          <p:cTn id="4" fill="hold">
+                            <p:stCondLst>
+                              <p:cond delay="0"/>
+                            </p:stCondLst>
+                            <p:childTnLst>
+                              <p:par>
+                                <p:cTn id="5" presetID="50" presetClass="entr" presetSubtype="0" decel="100000" fill="hold" nodeType="clickEffect">
+                                  <p:stCondLst>
+                                    <p:cond delay="0"/>
+                                  </p:stCondLst>
+                                  <p:childTnLst>
+                                    <p:set>
+                                      <p:cBhvr>
+                                        <p:cTn id="6" dur="1" fill="hold">
+                                          <p:stCondLst>
+                                            <p:cond delay="0"/>
+                                          </p:stCondLst>
+                                        </p:cTn>
+                                        <p:tgtEl>
+                                          <p:spTgt spid="4"/>
+                                        </p:tgtEl>
+                                        <p:attrNameLst>
+                                          <p:attrName>style.visibility</p:attrName>
+                                        </p:attrNameLst>
+                                      </p:cBhvr>
+                                      <p:to>
+                                        <p:strVal val="visible"/>
+                                      </p:to>
+                                    </p:set>
+                                    <p:anim calcmode="lin" valueType="num">
+                                      <p:cBhvr>
+                                        <p:cTn id="7" dur="1000" fill="hold"/>
+                                        <p:tgtEl>
+                                          <p:spTgt spid="4"/>
+                                        </p:tgtEl>
+                                        <p:attrNameLst>
+                                          <p:attrName>ppt_w</p:attrName>
+                                        </p:attrNameLst>
+                                      </p:cBhvr>
+                                      <p:tavLst>
+                                        <p:tav tm="0">
+                                          <p:val>
+                                            <p:strVal val="#ppt_w+.3"/>
+                                          </p:val>
+                                        </p:tav>
+                                        <p:tav tm="100000">
+                                          <p:val>
+                                            <p:strVal val="#ppt_w"/>
+                                          </p:val>
+                                        </p:tav>
+                                      </p:tavLst>
+                                    </p:anim>
+                                    <p:anim calcmode="lin" valueType="num">
+                                      <p:cBhvr>
+                                        <p:cTn id="8" dur="1000" fill="hold"/>
+                                        <p:tgtEl>
+                                          <p:spTgt spid="4"/>
+                                        </p:tgtEl>
+                                        <p:attrNameLst>
+                                          <p:attrName>ppt_h</p:attrName>
+                                        </p:attrNameLst>
+                                      </p:cBhvr>
+                                      <p:tavLst>
+                                        <p:tav tm="0">
+                                          <p:val>
+                                            <p:strVal val="#ppt_h"/>
+                                          </p:val>
+                                        </p:tav>
+                                        <p:tav tm="100000">
+                                          <p:val>
+                                            <p:strVal val="#ppt_h"/>
+                                          </p:val>
+                                        </p:tav>
+                                      </p:tavLst>
+                                    </p:anim>
+                                    <p:animEffect transition="in" filter="fade">
+                                      <p:cBhvr>
+                                        <p:cTn id="9" dur="1000"/>
+                                        <p:tgtEl>
+                                          <p:spTgt spid="4"/>
+                                        </p:tgtEl>
+                                      </p:cBhvr>
+                                    </p:animEffect>
+                                  </p:childTnLst>
+                                </p:cTn>
+                              </p:par>
+                            </p:childTnLst>
+                          </p:cTn>
+                        </p:par>
+                      </p:childTnLst>
+                    </p:cTn>
+                  </p:par>
+                  <p:par>
+                    <p:cTn id="10" fill="hold">
+                      <p:stCondLst>
+                        <p:cond delay="indefinite"/>
+                      </p:stCondLst>
+                      <p:childTnLst>
+                        <p:par>
+                          <p:cTn id="11" fill="hold">
+                            <p:stCondLst>
+                              <p:cond delay="0"/>
+                            </p:stCondLst>
+                            <p:childTnLst>
+                              <p:par>
+                                <p:cTn id="12" presetID="50" presetClass="entr" presetSubtype="0" decel="100000" fill="hold" nodeType="clickEffect">
+                                  <p:stCondLst>
+                                    <p:cond delay="0"/>
+                                  </p:stCondLst>
+                                  <p:childTnLst>
+                                    <p:set>
+                                      <p:cBhvr>
+                                        <p:cTn id="13" dur="1" fill="hold">
+                                          <p:stCondLst>
+                                            <p:cond delay="0"/>
+                                          </p:stCondLst>
+                                        </p:cTn>
+                                        <p:tgtEl>
+                                          <p:spTgt spid="5"/>
+                                        </p:tgtEl>
+                                        <p:attrNameLst>
+                                          <p:attrName>style.visibility</p:attrName>
+                                        </p:attrNameLst>
+                                      </p:cBhvr>
+                                      <p:to>
+                                        <p:strVal val="visible"/>
+                                      </p:to>
+                                    </p:set>
+                                    <p:anim calcmode="lin" valueType="num">
+                                      <p:cBhvr>
+                                        <p:cTn id="14" dur="1000" fill="hold"/>
+                                        <p:tgtEl>
+                                          <p:spTgt spid="5"/>
+                                        </p:tgtEl>
+                                        <p:attrNameLst>
+                                          <p:attrName>ppt_w</p:attrName>
+                                        </p:attrNameLst>
+                                      </p:cBhvr>
+                                      <p:tavLst>
+                                        <p:tav tm="0">
+                                          <p:val>
+                                            <p:strVal val="#ppt_w+.3"/>
+                                          </p:val>
+                                        </p:tav>
+                                        <p:tav tm="100000">
+                                          <p:val>
+                                            <p:strVal val="#ppt_w"/>
+                                          </p:val>
+                                        </p:tav>
+                                      </p:tavLst>
+                                    </p:anim>
+                                    <p:anim calcmode="lin" valueType="num">
+                                      <p:cBhvr>
+                                        <p:cTn id="15" dur="1000" fill="hold"/>
+                                        <p:tgtEl>
+                                          <p:spTgt spid="5"/>
+                                        </p:tgtEl>
+                                        <p:attrNameLst>
+                                          <p:attrName>ppt_h</p:attrName>
+                                        </p:attrNameLst>
+                                      </p:cBhvr>
+                                      <p:tavLst>
+                                        <p:tav tm="0">
+                                          <p:val>
+                                            <p:strVal val="#ppt_h"/>
+                                          </p:val>
+                                        </p:tav>
+                                        <p:tav tm="100000">
+                                          <p:val>
+                                            <p:strVal val="#ppt_h"/>
+                                          </p:val>
+                                        </p:tav>
+                                      </p:tavLst>
+                                    </p:anim>
+                                    <p:animEffect transition="in" filter="fade">
+                                      <p:cBhvr>
+                                        <p:cTn id="16" dur="1000"/>
+                                        <p:tgtEl>
+                                          <p:spTgt spid="5"/>
+                                        </p:tgtEl>
+                                      </p:cBhvr>
+                                    </p:animEffect>
+                                  </p:childTnLst>
+                                </p:cTn>
+                              </p:par>
+                            </p:childTnLst>
+                          </p:cTn>
+                        </p:par>
+                      </p:childTnLst>
+                    </p:cTn>
+                  </p:par>
+                  <p:par>
+                    <p:cTn id="17" fill="hold">
+                      <p:stCondLst>
+                        <p:cond delay="indefinite"/>
+                      </p:stCondLst>
+                      <p:childTnLst>
+                        <p:par>
+                          <p:cTn id="18" fill="hold">
+                            <p:stCondLst>
+                              <p:cond delay="0"/>
+                            </p:stCondLst>
+                            <p:childTnLst>
+                              <p:par>
+                                <p:cTn id="19" presetID="50" presetClass="entr" presetSubtype="0" decel="100000" fill="hold" nodeType="clickEffect">
+                                  <p:stCondLst>
+                                    <p:cond delay="0"/>
+                                  </p:stCondLst>
+                                  <p:childTnLst>
+                                    <p:set>
+                                      <p:cBhvr>
+                                        <p:cTn id="20" dur="1" fill="hold">
+                                          <p:stCondLst>
+                                            <p:cond delay="0"/>
+                                          </p:stCondLst>
+                                        </p:cTn>
+                                        <p:tgtEl>
+                                          <p:spTgt spid="7"/>
+                                        </p:tgtEl>
+                                        <p:attrNameLst>
+                                          <p:attrName>style.visibility</p:attrName>
+                                        </p:attrNameLst>
+                                      </p:cBhvr>
+                                      <p:to>
+                                        <p:strVal val="visible"/>
+                                      </p:to>
+                                    </p:set>
+                                    <p:anim calcmode="lin" valueType="num">
+                                      <p:cBhvr>
+                                        <p:cTn id="21" dur="1000" fill="hold"/>
+                                        <p:tgtEl>
+                                          <p:spTgt spid="7"/>
+                                        </p:tgtEl>
+                                        <p:attrNameLst>
+                                          <p:attrName>ppt_w</p:attrName>
+                                        </p:attrNameLst>
+                                      </p:cBhvr>
+                                      <p:tavLst>
+                                        <p:tav tm="0">
+                                          <p:val>
+                                            <p:strVal val="#ppt_w+.3"/>
+                                          </p:val>
+                                        </p:tav>
+                                        <p:tav tm="100000">
+                                          <p:val>
+                                            <p:strVal val="#ppt_w"/>
+                                          </p:val>
+                                        </p:tav>
+                                      </p:tavLst>
+                                    </p:anim>
+                                    <p:anim calcmode="lin" valueType="num">
+                                      <p:cBhvr>
+                                        <p:cTn id="22" dur="1000" fill="hold"/>
+                                        <p:tgtEl>
+                                          <p:spTgt spid="7"/>
+                                        </p:tgtEl>
+                                        <p:attrNameLst>
+                                          <p:attrName>ppt_h</p:attrName>
+                                        </p:attrNameLst>
+                                      </p:cBhvr>
+                                      <p:tavLst>
+                                        <p:tav tm="0">
+                                          <p:val>
+                                            <p:strVal val="#ppt_h"/>
+                                          </p:val>
+                                        </p:tav>
+                                        <p:tav tm="100000">
+                                          <p:val>
+                                            <p:strVal val="#ppt_h"/>
+                                          </p:val>
+                                        </p:tav>
+                                      </p:tavLst>
+                                    </p:anim>
+                                    <p:animEffect transition="in" filter="fade">
+                                      <p:cBhvr>
+                                        <p:cTn id="23" dur="1000"/>
+                                        <p:tgtEl>
+                                          <p:spTgt spid="7"/>
+                                        </p:tgtEl>
+                                      </p:cBhvr>
+                                    </p:animEffect>
+                                  </p:childTnLst>
+                                </p:cTn>
+                              </p:par>
+                            </p:childTnLst>
+                          </p:cTn>
+                        </p:par>
+                      </p:childTnLst>
+                    </p:cTn>
+                  </p:par>
+                </p:childTnLst>
+              </p:cTn>
+              <p:prevCondLst>
+                <p:cond evt="onPrev" delay="0">
+                  <p:tgtEl>
+                    <p:sldTgt/>
+                  </p:tgtEl>
+                </p:cond>
+              </p:prevCondLst>
+              <p:nextCondLst>
+                <p:cond evt="onNext" delay="0">
+                  <p:tgtEl>
+                    <p:sldTgt/>
+                  </p:tgtEl>
+                </p:cond>
+              </p:nextCondLst>
+            </p:seq>
+          </p:childTnLst>
+        </p:cTn>
       </p:par>
     </p:tnLst>
   </p:timing>
@@ -4382,7 +5326,12 @@
             <p:ph idx="1"/>
           </p:nvPr>
         </p:nvSpPr>
-        <p:spPr/>
+        <p:spPr>
+          <a:xfrm>
+            <a:off x="533400" y="2332037"/>
+            <a:ext cx="8229600" cy="4525963"/>
+          </a:xfrm>
+        </p:spPr>
         <p:txBody>
           <a:bodyPr>
             <a:normAutofit/>
@@ -4465,6 +5414,30 @@
           </a:p>
         </p:txBody>
       </p:sp>
+      <p:pic>
+        <p:nvPicPr>
+          <p:cNvPr id="4" name="Picture 3" descr="Gtugs.jpg"/>
+          <p:cNvPicPr>
+            <a:picLocks noChangeAspect="1"/>
+          </p:cNvPicPr>
+          <p:nvPr/>
+        </p:nvPicPr>
+        <p:blipFill>
+          <a:blip r:embed="rId3" cstate="print"/>
+          <a:stretch>
+            <a:fillRect/>
+          </a:stretch>
+        </p:blipFill>
+        <p:spPr>
+          <a:xfrm>
+            <a:off x="2743200" y="142875"/>
+            <a:ext cx="3962400" cy="1609725"/>
+          </a:xfrm>
+          <a:prstGeom prst="rect">
+            <a:avLst/>
+          </a:prstGeom>
+        </p:spPr>
+      </p:pic>
     </p:spTree>
   </p:cSld>
   <p:clrMapOvr>
@@ -5990,9 +6963,6 @@
               </a:rPr>
               <a:t> Out put Snapshoot</a:t>
             </a:r>
-            <a:endParaRPr lang="en-US" sz="3600" dirty="0" smtClean="0">
-              <a:latin typeface="Hobo Std" pitchFamily="34" charset="0"/>
-            </a:endParaRPr>
           </a:p>
           <a:p>
             <a:pPr algn="l" rtl="0">
@@ -6100,17 +7070,7 @@
                 <a:latin typeface="Cooper Std Black" pitchFamily="18" charset="0"/>
                 <a:cs typeface="ae_AlMateen" pitchFamily="18" charset="-78"/>
               </a:rPr>
-              <a:t>(</a:t>
-            </a:r>
-            <a:r>
-              <a:rPr lang="ar-SA" sz="4800" b="1" dirty="0" smtClean="0">
-                <a:solidFill>
-                  <a:srgbClr val="C00000"/>
-                </a:solidFill>
-                <a:latin typeface="Cooper Std Black" pitchFamily="18" charset="0"/>
-                <a:cs typeface="ae_AlMateen" pitchFamily="18" charset="-78"/>
-              </a:rPr>
-              <a:t>1</a:t>
+              <a:t>(1</a:t>
             </a:r>
             <a:r>
               <a:rPr lang="ar-SA" sz="4800" b="1" dirty="0" err="1" smtClean="0">
@@ -6159,7 +7119,7 @@
                 <a:latin typeface="Cooper Std Black" pitchFamily="18" charset="0"/>
                 <a:cs typeface="ae_AlMateen" pitchFamily="18" charset="-78"/>
               </a:rPr>
-              <a:t>Smart Sheet</a:t>
+              <a:t>Paper &amp; Pen</a:t>
             </a:r>
             <a:endParaRPr lang="ar-SA" sz="4800" b="1" dirty="0" smtClean="0">
               <a:solidFill>
@@ -6634,17 +7594,7 @@
                 <a:latin typeface="Cooper Std Black" pitchFamily="18" charset="0"/>
                 <a:cs typeface="ae_AlMateen" pitchFamily="18" charset="-78"/>
               </a:rPr>
-              <a:t> </a:t>
-            </a:r>
-            <a:r>
-              <a:rPr lang="en-US" sz="4800" b="1" dirty="0" smtClean="0">
-                <a:solidFill>
-                  <a:srgbClr val="C00000"/>
-                </a:solidFill>
-                <a:latin typeface="Cooper Std Black" pitchFamily="18" charset="0"/>
-                <a:cs typeface="ae_AlMateen" pitchFamily="18" charset="-78"/>
-              </a:rPr>
-              <a:t>Smart Sheet</a:t>
+              <a:t> Smart Sheet</a:t>
             </a:r>
             <a:endParaRPr lang="ar-SA" sz="4800" b="1" dirty="0" smtClean="0">
               <a:solidFill>
@@ -6802,7 +7752,7 @@
         </p:blipFill>
         <p:spPr bwMode="auto">
           <a:xfrm>
-            <a:off x="-14689" y="930819"/>
+            <a:off x="-14689" y="185239"/>
             <a:ext cx="9158689" cy="4843961"/>
           </a:xfrm>
           <a:prstGeom prst="rect">
@@ -7080,17 +8030,7 @@
                 <a:latin typeface="Cooper Std Black" pitchFamily="18" charset="0"/>
                 <a:cs typeface="ae_AlMateen" pitchFamily="18" charset="-78"/>
               </a:rPr>
-              <a:t> </a:t>
-            </a:r>
-            <a:r>
-              <a:rPr lang="ar-SA" sz="4800" b="1" dirty="0" smtClean="0">
-                <a:solidFill>
-                  <a:srgbClr val="C00000"/>
-                </a:solidFill>
-                <a:latin typeface="Cooper Std Black" pitchFamily="18" charset="0"/>
-                <a:cs typeface="ae_AlMateen" pitchFamily="18" charset="-78"/>
-              </a:rPr>
-              <a:t>(3</a:t>
+              <a:t> (3</a:t>
             </a:r>
             <a:r>
               <a:rPr lang="ar-SA" sz="4800" b="1" dirty="0" err="1" smtClean="0">
@@ -7287,8 +8227,8 @@
         </p:blipFill>
         <p:spPr bwMode="auto">
           <a:xfrm>
-            <a:off x="-14689" y="787291"/>
-            <a:ext cx="9158689" cy="5131018"/>
+            <a:off x="-14689" y="0"/>
+            <a:ext cx="9158689" cy="5029200"/>
           </a:xfrm>
           <a:prstGeom prst="rect">
             <a:avLst/>

</xml_diff>